<commit_message>
Add Singleton pattern relationships
Signed-off-by: Kyrylo Vasylenko <vasilenkowm@gmail.com>
</commit_message>
<xml_diff>
--- a/Singleton/Presentation/Singleton.pptx
+++ b/Singleton/Presentation/Singleton.pptx
@@ -5,11 +5,15 @@
     <p:sldMasterId id="2147483648" r:id="rId2"/>
   </p:sldMasterIdLst>
   <p:notesMasterIdLst>
-    <p:notesMasterId r:id="rId5"/>
+    <p:notesMasterId r:id="rId6"/>
   </p:notesMasterIdLst>
+  <p:handoutMasterIdLst>
+    <p:handoutMasterId r:id="rId7"/>
+  </p:handoutMasterIdLst>
   <p:sldIdLst>
     <p:sldId id="261" r:id="rId3"/>
     <p:sldId id="262" r:id="rId4"/>
+    <p:sldId id="263" r:id="rId5"/>
   </p:sldIdLst>
   <p:sldSz cx="12192000" cy="6858000"/>
   <p:notesSz cx="6858000" cy="9144000"/>
@@ -110,7 +114,18 @@
   </p:defaultTextStyle>
   <p:extLst>
     <p:ext uri="{EFAFB233-063F-42B5-8137-9DF3F51BA10A}">
-      <p15:sldGuideLst xmlns:p15="http://schemas.microsoft.com/office/powerpoint/2012/main"/>
+      <p15:sldGuideLst xmlns:p15="http://schemas.microsoft.com/office/powerpoint/2012/main">
+        <p15:guide id="1" orient="horz" pos="2160" userDrawn="1">
+          <p15:clr>
+            <a:srgbClr val="A4A3A4"/>
+          </p15:clr>
+        </p15:guide>
+        <p15:guide id="2" pos="3840" userDrawn="1">
+          <p15:clr>
+            <a:srgbClr val="A4A3A4"/>
+          </p15:clr>
+        </p15:guide>
+      </p15:sldGuideLst>
     </p:ext>
   </p:extLst>
 </p:presentation>
@@ -126,6 +141,172 @@
     </p:extLst>
   </p:cmAuthor>
 </p:cmAuthorLst>
+</file>
+
+<file path=ppt/handoutMasters/handoutMaster1.xml><?xml version="1.0" encoding="utf-8"?>
+<p:handoutMaster xmlns:a="http://schemas.openxmlformats.org/drawingml/2006/main" xmlns:r="http://schemas.openxmlformats.org/officeDocument/2006/relationships" xmlns:p="http://schemas.openxmlformats.org/presentationml/2006/main">
+  <p:cSld>
+    <p:bg>
+      <p:bgRef idx="1001">
+        <a:schemeClr val="bg1"/>
+      </p:bgRef>
+    </p:bg>
+    <p:spTree>
+      <p:nvGrpSpPr>
+        <p:cNvPr id="1" name=""/>
+        <p:cNvGrpSpPr/>
+        <p:nvPr/>
+      </p:nvGrpSpPr>
+      <p:grpSpPr>
+        <a:xfrm>
+          <a:off x="0" y="0"/>
+          <a:ext cx="0" cy="0"/>
+          <a:chOff x="0" y="0"/>
+          <a:chExt cx="0" cy="0"/>
+        </a:xfrm>
+      </p:grpSpPr>
+      <p:sp>
+        <p:nvSpPr>
+          <p:cNvPr id="2" name="Header Placeholder 1"/>
+          <p:cNvSpPr>
+            <a:spLocks noGrp="1"/>
+          </p:cNvSpPr>
+          <p:nvPr>
+            <p:ph type="hdr" sz="quarter"/>
+          </p:nvPr>
+        </p:nvSpPr>
+        <p:spPr>
+          <a:xfrm>
+            <a:off x="0" y="0"/>
+            <a:ext cx="2971800" cy="458788"/>
+          </a:xfrm>
+          <a:prstGeom prst="rect">
+            <a:avLst/>
+          </a:prstGeom>
+        </p:spPr>
+        <p:txBody>
+          <a:bodyPr vert="horz" lIns="91440" tIns="45720" rIns="91440" bIns="45720" rtlCol="0"/>
+          <a:lstStyle>
+            <a:lvl1pPr algn="l">
+              <a:defRPr sz="1200"/>
+            </a:lvl1pPr>
+          </a:lstStyle>
+          <a:p>
+            <a:endParaRPr lang="ru-RU"/>
+          </a:p>
+        </p:txBody>
+      </p:sp>
+      <p:sp>
+        <p:nvSpPr>
+          <p:cNvPr id="3" name="Date Placeholder 2"/>
+          <p:cNvSpPr>
+            <a:spLocks noGrp="1"/>
+          </p:cNvSpPr>
+          <p:nvPr>
+            <p:ph type="dt" sz="quarter" idx="1"/>
+          </p:nvPr>
+        </p:nvSpPr>
+        <p:spPr>
+          <a:xfrm>
+            <a:off x="3884613" y="0"/>
+            <a:ext cx="2971800" cy="458788"/>
+          </a:xfrm>
+          <a:prstGeom prst="rect">
+            <a:avLst/>
+          </a:prstGeom>
+        </p:spPr>
+        <p:txBody>
+          <a:bodyPr vert="horz" lIns="91440" tIns="45720" rIns="91440" bIns="45720" rtlCol="0"/>
+          <a:lstStyle>
+            <a:lvl1pPr algn="r">
+              <a:defRPr sz="1200"/>
+            </a:lvl1pPr>
+          </a:lstStyle>
+          <a:p>
+            <a:fld id="{7DA61AE2-9EF6-415B-9BBA-5F4A98ACC92C}" type="datetimeFigureOut">
+              <a:rPr lang="ru-RU" smtClean="0"/>
+              <a:t>19.02.2019</a:t>
+            </a:fld>
+            <a:endParaRPr lang="ru-RU"/>
+          </a:p>
+        </p:txBody>
+      </p:sp>
+      <p:sp>
+        <p:nvSpPr>
+          <p:cNvPr id="4" name="Footer Placeholder 3"/>
+          <p:cNvSpPr>
+            <a:spLocks noGrp="1"/>
+          </p:cNvSpPr>
+          <p:nvPr>
+            <p:ph type="ftr" sz="quarter" idx="2"/>
+          </p:nvPr>
+        </p:nvSpPr>
+        <p:spPr>
+          <a:xfrm>
+            <a:off x="0" y="8685213"/>
+            <a:ext cx="2971800" cy="458787"/>
+          </a:xfrm>
+          <a:prstGeom prst="rect">
+            <a:avLst/>
+          </a:prstGeom>
+        </p:spPr>
+        <p:txBody>
+          <a:bodyPr vert="horz" lIns="91440" tIns="45720" rIns="91440" bIns="45720" rtlCol="0" anchor="b"/>
+          <a:lstStyle>
+            <a:lvl1pPr algn="l">
+              <a:defRPr sz="1200"/>
+            </a:lvl1pPr>
+          </a:lstStyle>
+          <a:p>
+            <a:endParaRPr lang="ru-RU"/>
+          </a:p>
+        </p:txBody>
+      </p:sp>
+      <p:sp>
+        <p:nvSpPr>
+          <p:cNvPr id="5" name="Slide Number Placeholder 4"/>
+          <p:cNvSpPr>
+            <a:spLocks noGrp="1"/>
+          </p:cNvSpPr>
+          <p:nvPr>
+            <p:ph type="sldNum" sz="quarter" idx="3"/>
+          </p:nvPr>
+        </p:nvSpPr>
+        <p:spPr>
+          <a:xfrm>
+            <a:off x="3884613" y="8685213"/>
+            <a:ext cx="2971800" cy="458787"/>
+          </a:xfrm>
+          <a:prstGeom prst="rect">
+            <a:avLst/>
+          </a:prstGeom>
+        </p:spPr>
+        <p:txBody>
+          <a:bodyPr vert="horz" lIns="91440" tIns="45720" rIns="91440" bIns="45720" rtlCol="0" anchor="b"/>
+          <a:lstStyle>
+            <a:lvl1pPr algn="r">
+              <a:defRPr sz="1200"/>
+            </a:lvl1pPr>
+          </a:lstStyle>
+          <a:p>
+            <a:fld id="{FA0BC671-BE0D-482E-B0C4-A419035D2824}" type="slidenum">
+              <a:rPr lang="ru-RU" smtClean="0"/>
+              <a:t>‹#›</a:t>
+            </a:fld>
+            <a:endParaRPr lang="ru-RU"/>
+          </a:p>
+        </p:txBody>
+      </p:sp>
+    </p:spTree>
+    <p:extLst>
+      <p:ext uri="{BB962C8B-B14F-4D97-AF65-F5344CB8AC3E}">
+        <p14:creationId xmlns:p14="http://schemas.microsoft.com/office/powerpoint/2010/main" val="2196276456"/>
+      </p:ext>
+    </p:extLst>
+  </p:cSld>
+  <p:clrMap bg1="lt1" tx1="dk1" bg2="lt2" tx2="dk2" accent1="accent1" accent2="accent2" accent3="accent3" accent4="accent4" accent5="accent5" accent6="accent6" hlink="hlink" folHlink="folHlink"/>
+  <p:hf sldNum="0" hdr="0" ftr="0" dt="0"/>
+</p:handoutMaster>
 </file>
 
 <file path=ppt/notesMasters/notesMaster1.xml><?xml version="1.0" encoding="utf-8"?>
@@ -383,6 +564,7 @@
     </p:extLst>
   </p:cSld>
   <p:clrMap bg1="lt1" tx1="dk1" bg2="lt2" tx2="dk2" accent1="accent1" accent2="accent2" accent3="accent3" accent4="accent4" accent5="accent5" accent6="accent6" hlink="hlink" folHlink="folHlink"/>
+  <p:hf sldNum="0" hdr="0" ftr="0" dt="0"/>
   <p:notesStyle>
     <a:lvl1pPr marL="0" algn="l" defTabSz="914400" rtl="0" eaLnBrk="1" latinLnBrk="0" hangingPunct="1">
       <a:defRPr sz="1200" kern="1200">
@@ -535,29 +717,6 @@
           </a:p>
         </p:txBody>
       </p:sp>
-      <p:sp>
-        <p:nvSpPr>
-          <p:cNvPr id="4" name="Slide Number Placeholder 3"/>
-          <p:cNvSpPr>
-            <a:spLocks noGrp="1"/>
-          </p:cNvSpPr>
-          <p:nvPr>
-            <p:ph type="sldNum" sz="quarter" idx="5"/>
-          </p:nvPr>
-        </p:nvSpPr>
-        <p:spPr/>
-        <p:txBody>
-          <a:bodyPr/>
-          <a:lstStyle/>
-          <a:p>
-            <a:fld id="{943104D4-D03D-4963-8C51-3D5BE5CAA099}" type="slidenum">
-              <a:rPr lang="ru-RU" smtClean="0"/>
-              <a:t>1</a:t>
-            </a:fld>
-            <a:endParaRPr lang="ru-RU"/>
-          </a:p>
-        </p:txBody>
-      </p:sp>
     </p:spTree>
     <p:extLst>
       <p:ext uri="{BB962C8B-B14F-4D97-AF65-F5344CB8AC3E}">
@@ -700,9 +859,9 @@
           <a:bodyPr/>
           <a:lstStyle/>
           <a:p>
-            <a:fld id="{5E987183-CF93-4028-987F-0BDD6D444B75}" type="datetimeFigureOut">
-              <a:rPr lang="ru-RU" smtClean="0"/>
-              <a:t>19.02.2019</a:t>
+            <a:fld id="{7B55B851-DE93-4D4A-A8CA-11031B51EA79}" type="datetime3">
+              <a:rPr lang="en-US" smtClean="0"/>
+              <a:t>19 February 2019</a:t>
             </a:fld>
             <a:endParaRPr lang="ru-RU"/>
           </a:p>
@@ -723,6 +882,10 @@
           <a:bodyPr/>
           <a:lstStyle/>
           <a:p>
+            <a:r>
+              <a:rPr lang="en-US" smtClean="0"/>
+              <a:t>@Bellkross</a:t>
+            </a:r>
             <a:endParaRPr lang="ru-RU"/>
           </a:p>
         </p:txBody>
@@ -760,14 +923,21 @@
   <p:clrMapOvr>
     <a:masterClrMapping/>
   </p:clrMapOvr>
-  <mc:AlternateContent xmlns:mc="http://schemas.openxmlformats.org/markup-compatibility/2006">
-    <mc:Choice xmlns:p14="http://schemas.microsoft.com/office/powerpoint/2010/main" Requires="p14">
+  <mc:AlternateContent xmlns:mc="http://schemas.openxmlformats.org/markup-compatibility/2006" xmlns:p14="http://schemas.microsoft.com/office/powerpoint/2010/main">
+    <mc:Choice Requires="p14">
       <p:transition p14:dur="10" advClick="0"/>
     </mc:Choice>
-    <mc:Fallback>
+    <mc:Fallback xmlns="">
       <p:transition advClick="0"/>
     </mc:Fallback>
   </mc:AlternateContent>
+  <p:timing>
+    <p:tnLst>
+      <p:par>
+        <p:cTn id="1" dur="indefinite" restart="never" nodeType="tmRoot"/>
+      </p:par>
+    </p:tnLst>
+  </p:timing>
 </p:sldLayout>
 </file>
 
@@ -878,9 +1048,9 @@
           <a:bodyPr/>
           <a:lstStyle/>
           <a:p>
-            <a:fld id="{5E987183-CF93-4028-987F-0BDD6D444B75}" type="datetimeFigureOut">
-              <a:rPr lang="ru-RU" smtClean="0"/>
-              <a:t>19.02.2019</a:t>
+            <a:fld id="{E86EBA65-FBEF-4E78-B3EC-E0E9A1688544}" type="datetime3">
+              <a:rPr lang="en-US" smtClean="0"/>
+              <a:t>19 February 2019</a:t>
             </a:fld>
             <a:endParaRPr lang="ru-RU"/>
           </a:p>
@@ -901,6 +1071,10 @@
           <a:bodyPr/>
           <a:lstStyle/>
           <a:p>
+            <a:r>
+              <a:rPr lang="en-US" smtClean="0"/>
+              <a:t>@Bellkross</a:t>
+            </a:r>
             <a:endParaRPr lang="ru-RU"/>
           </a:p>
         </p:txBody>
@@ -938,11 +1112,11 @@
   <p:clrMapOvr>
     <a:masterClrMapping/>
   </p:clrMapOvr>
-  <mc:AlternateContent xmlns:mc="http://schemas.openxmlformats.org/markup-compatibility/2006">
-    <mc:Choice xmlns:p14="http://schemas.microsoft.com/office/powerpoint/2010/main" Requires="p14">
+  <mc:AlternateContent xmlns:mc="http://schemas.openxmlformats.org/markup-compatibility/2006" xmlns:p14="http://schemas.microsoft.com/office/powerpoint/2010/main">
+    <mc:Choice Requires="p14">
       <p:transition p14:dur="10" advClick="0"/>
     </mc:Choice>
-    <mc:Fallback>
+    <mc:Fallback xmlns="">
       <p:transition advClick="0"/>
     </mc:Fallback>
   </mc:AlternateContent>
@@ -1066,9 +1240,9 @@
           <a:bodyPr/>
           <a:lstStyle/>
           <a:p>
-            <a:fld id="{5E987183-CF93-4028-987F-0BDD6D444B75}" type="datetimeFigureOut">
-              <a:rPr lang="ru-RU" smtClean="0"/>
-              <a:t>19.02.2019</a:t>
+            <a:fld id="{B7F9F018-6DB4-4741-B32F-EC558344D423}" type="datetime3">
+              <a:rPr lang="en-US" smtClean="0"/>
+              <a:t>19 February 2019</a:t>
             </a:fld>
             <a:endParaRPr lang="ru-RU"/>
           </a:p>
@@ -1089,6 +1263,10 @@
           <a:bodyPr/>
           <a:lstStyle/>
           <a:p>
+            <a:r>
+              <a:rPr lang="en-US" smtClean="0"/>
+              <a:t>@Bellkross</a:t>
+            </a:r>
             <a:endParaRPr lang="ru-RU"/>
           </a:p>
         </p:txBody>
@@ -1126,11 +1304,11 @@
   <p:clrMapOvr>
     <a:masterClrMapping/>
   </p:clrMapOvr>
-  <mc:AlternateContent xmlns:mc="http://schemas.openxmlformats.org/markup-compatibility/2006">
-    <mc:Choice xmlns:p14="http://schemas.microsoft.com/office/powerpoint/2010/main" Requires="p14">
+  <mc:AlternateContent xmlns:mc="http://schemas.openxmlformats.org/markup-compatibility/2006" xmlns:p14="http://schemas.microsoft.com/office/powerpoint/2010/main">
+    <mc:Choice Requires="p14">
       <p:transition p14:dur="10" advClick="0"/>
     </mc:Choice>
-    <mc:Fallback>
+    <mc:Fallback xmlns="">
       <p:transition advClick="0"/>
     </mc:Fallback>
   </mc:AlternateContent>
@@ -1244,9 +1422,9 @@
           <a:bodyPr/>
           <a:lstStyle/>
           <a:p>
-            <a:fld id="{5E987183-CF93-4028-987F-0BDD6D444B75}" type="datetimeFigureOut">
-              <a:rPr lang="ru-RU" smtClean="0"/>
-              <a:t>19.02.2019</a:t>
+            <a:fld id="{F3E29414-314B-4BBC-90EC-F581425B44D3}" type="datetime3">
+              <a:rPr lang="en-US" smtClean="0"/>
+              <a:t>19 February 2019</a:t>
             </a:fld>
             <a:endParaRPr lang="ru-RU"/>
           </a:p>
@@ -1267,6 +1445,10 @@
           <a:bodyPr/>
           <a:lstStyle/>
           <a:p>
+            <a:r>
+              <a:rPr lang="en-US" smtClean="0"/>
+              <a:t>@Bellkross</a:t>
+            </a:r>
             <a:endParaRPr lang="ru-RU"/>
           </a:p>
         </p:txBody>
@@ -1304,14 +1486,21 @@
   <p:clrMapOvr>
     <a:masterClrMapping/>
   </p:clrMapOvr>
-  <mc:AlternateContent xmlns:mc="http://schemas.openxmlformats.org/markup-compatibility/2006">
-    <mc:Choice xmlns:p14="http://schemas.microsoft.com/office/powerpoint/2010/main" Requires="p14">
+  <mc:AlternateContent xmlns:mc="http://schemas.openxmlformats.org/markup-compatibility/2006" xmlns:p14="http://schemas.microsoft.com/office/powerpoint/2010/main">
+    <mc:Choice Requires="p14">
       <p:transition p14:dur="10" advClick="0"/>
     </mc:Choice>
-    <mc:Fallback>
+    <mc:Fallback xmlns="">
       <p:transition advClick="0"/>
     </mc:Fallback>
   </mc:AlternateContent>
+  <p:timing>
+    <p:tnLst>
+      <p:par>
+        <p:cTn id="1" dur="indefinite" restart="never" nodeType="tmRoot"/>
+      </p:par>
+    </p:tnLst>
+  </p:timing>
 </p:sldLayout>
 </file>
 
@@ -1498,9 +1687,9 @@
           <a:bodyPr/>
           <a:lstStyle/>
           <a:p>
-            <a:fld id="{5E987183-CF93-4028-987F-0BDD6D444B75}" type="datetimeFigureOut">
-              <a:rPr lang="ru-RU" smtClean="0"/>
-              <a:t>19.02.2019</a:t>
+            <a:fld id="{C197B7D8-4027-4BC0-B809-A55EFBE429E1}" type="datetime3">
+              <a:rPr lang="en-US" smtClean="0"/>
+              <a:t>19 February 2019</a:t>
             </a:fld>
             <a:endParaRPr lang="ru-RU"/>
           </a:p>
@@ -1521,6 +1710,10 @@
           <a:bodyPr/>
           <a:lstStyle/>
           <a:p>
+            <a:r>
+              <a:rPr lang="en-US" smtClean="0"/>
+              <a:t>@Bellkross</a:t>
+            </a:r>
             <a:endParaRPr lang="ru-RU"/>
           </a:p>
         </p:txBody>
@@ -1558,11 +1751,11 @@
   <p:clrMapOvr>
     <a:masterClrMapping/>
   </p:clrMapOvr>
-  <mc:AlternateContent xmlns:mc="http://schemas.openxmlformats.org/markup-compatibility/2006">
-    <mc:Choice xmlns:p14="http://schemas.microsoft.com/office/powerpoint/2010/main" Requires="p14">
+  <mc:AlternateContent xmlns:mc="http://schemas.openxmlformats.org/markup-compatibility/2006" xmlns:p14="http://schemas.microsoft.com/office/powerpoint/2010/main">
+    <mc:Choice Requires="p14">
       <p:transition p14:dur="10" advClick="0"/>
     </mc:Choice>
-    <mc:Fallback>
+    <mc:Fallback xmlns="">
       <p:transition advClick="0"/>
     </mc:Fallback>
   </mc:AlternateContent>
@@ -1738,9 +1931,9 @@
           <a:bodyPr/>
           <a:lstStyle/>
           <a:p>
-            <a:fld id="{5E987183-CF93-4028-987F-0BDD6D444B75}" type="datetimeFigureOut">
-              <a:rPr lang="ru-RU" smtClean="0"/>
-              <a:t>19.02.2019</a:t>
+            <a:fld id="{B7C170E9-6698-4598-956D-28CDE8856D34}" type="datetime3">
+              <a:rPr lang="en-US" smtClean="0"/>
+              <a:t>19 February 2019</a:t>
             </a:fld>
             <a:endParaRPr lang="ru-RU"/>
           </a:p>
@@ -1761,6 +1954,10 @@
           <a:bodyPr/>
           <a:lstStyle/>
           <a:p>
+            <a:r>
+              <a:rPr lang="en-US" smtClean="0"/>
+              <a:t>@Bellkross</a:t>
+            </a:r>
             <a:endParaRPr lang="ru-RU"/>
           </a:p>
         </p:txBody>
@@ -1798,14 +1995,21 @@
   <p:clrMapOvr>
     <a:masterClrMapping/>
   </p:clrMapOvr>
-  <mc:AlternateContent xmlns:mc="http://schemas.openxmlformats.org/markup-compatibility/2006">
-    <mc:Choice xmlns:p14="http://schemas.microsoft.com/office/powerpoint/2010/main" Requires="p14">
+  <mc:AlternateContent xmlns:mc="http://schemas.openxmlformats.org/markup-compatibility/2006" xmlns:p14="http://schemas.microsoft.com/office/powerpoint/2010/main">
+    <mc:Choice Requires="p14">
       <p:transition p14:dur="10" advClick="0"/>
     </mc:Choice>
-    <mc:Fallback>
+    <mc:Fallback xmlns="">
       <p:transition advClick="0"/>
     </mc:Fallback>
   </mc:AlternateContent>
+  <p:timing>
+    <p:tnLst>
+      <p:par>
+        <p:cTn id="1" dur="indefinite" restart="never" nodeType="tmRoot"/>
+      </p:par>
+    </p:tnLst>
+  </p:timing>
 </p:sldLayout>
 </file>
 
@@ -2113,9 +2317,9 @@
           <a:bodyPr/>
           <a:lstStyle/>
           <a:p>
-            <a:fld id="{5E987183-CF93-4028-987F-0BDD6D444B75}" type="datetimeFigureOut">
-              <a:rPr lang="ru-RU" smtClean="0"/>
-              <a:t>19.02.2019</a:t>
+            <a:fld id="{D06DAEBC-00FB-43E2-9A62-728BCC36BCDE}" type="datetime3">
+              <a:rPr lang="en-US" smtClean="0"/>
+              <a:t>19 February 2019</a:t>
             </a:fld>
             <a:endParaRPr lang="ru-RU"/>
           </a:p>
@@ -2136,6 +2340,10 @@
           <a:bodyPr/>
           <a:lstStyle/>
           <a:p>
+            <a:r>
+              <a:rPr lang="en-US" smtClean="0"/>
+              <a:t>@Bellkross</a:t>
+            </a:r>
             <a:endParaRPr lang="ru-RU"/>
           </a:p>
         </p:txBody>
@@ -2173,14 +2381,21 @@
   <p:clrMapOvr>
     <a:masterClrMapping/>
   </p:clrMapOvr>
-  <mc:AlternateContent xmlns:mc="http://schemas.openxmlformats.org/markup-compatibility/2006">
-    <mc:Choice xmlns:p14="http://schemas.microsoft.com/office/powerpoint/2010/main" Requires="p14">
+  <mc:AlternateContent xmlns:mc="http://schemas.openxmlformats.org/markup-compatibility/2006" xmlns:p14="http://schemas.microsoft.com/office/powerpoint/2010/main">
+    <mc:Choice Requires="p14">
       <p:transition p14:dur="10" advClick="0"/>
     </mc:Choice>
-    <mc:Fallback>
+    <mc:Fallback xmlns="">
       <p:transition advClick="0"/>
     </mc:Fallback>
   </mc:AlternateContent>
+  <p:timing>
+    <p:tnLst>
+      <p:par>
+        <p:cTn id="1" dur="indefinite" restart="never" nodeType="tmRoot"/>
+      </p:par>
+    </p:tnLst>
+  </p:timing>
 </p:sldLayout>
 </file>
 
@@ -2239,9 +2454,9 @@
           <a:bodyPr/>
           <a:lstStyle/>
           <a:p>
-            <a:fld id="{5E987183-CF93-4028-987F-0BDD6D444B75}" type="datetimeFigureOut">
-              <a:rPr lang="ru-RU" smtClean="0"/>
-              <a:t>19.02.2019</a:t>
+            <a:fld id="{AB18DE3F-9B93-4889-A323-6EC312FABF66}" type="datetime3">
+              <a:rPr lang="en-US" smtClean="0"/>
+              <a:t>19 February 2019</a:t>
             </a:fld>
             <a:endParaRPr lang="ru-RU"/>
           </a:p>
@@ -2262,6 +2477,10 @@
           <a:bodyPr/>
           <a:lstStyle/>
           <a:p>
+            <a:r>
+              <a:rPr lang="en-US" smtClean="0"/>
+              <a:t>@Bellkross</a:t>
+            </a:r>
             <a:endParaRPr lang="ru-RU"/>
           </a:p>
         </p:txBody>
@@ -2299,14 +2518,21 @@
   <p:clrMapOvr>
     <a:masterClrMapping/>
   </p:clrMapOvr>
-  <mc:AlternateContent xmlns:mc="http://schemas.openxmlformats.org/markup-compatibility/2006">
-    <mc:Choice xmlns:p14="http://schemas.microsoft.com/office/powerpoint/2010/main" Requires="p14">
+  <mc:AlternateContent xmlns:mc="http://schemas.openxmlformats.org/markup-compatibility/2006" xmlns:p14="http://schemas.microsoft.com/office/powerpoint/2010/main">
+    <mc:Choice Requires="p14">
       <p:transition p14:dur="10" advClick="0"/>
     </mc:Choice>
-    <mc:Fallback>
+    <mc:Fallback xmlns="">
       <p:transition advClick="0"/>
     </mc:Fallback>
   </mc:AlternateContent>
+  <p:timing>
+    <p:tnLst>
+      <p:par>
+        <p:cTn id="1" dur="indefinite" restart="never" nodeType="tmRoot"/>
+      </p:par>
+    </p:tnLst>
+  </p:timing>
 </p:sldLayout>
 </file>
 
@@ -2342,9 +2568,9 @@
           <a:bodyPr/>
           <a:lstStyle/>
           <a:p>
-            <a:fld id="{5E987183-CF93-4028-987F-0BDD6D444B75}" type="datetimeFigureOut">
-              <a:rPr lang="ru-RU" smtClean="0"/>
-              <a:t>19.02.2019</a:t>
+            <a:fld id="{E8316F82-631A-4238-BABA-C9B8B6C4F978}" type="datetime3">
+              <a:rPr lang="en-US" smtClean="0"/>
+              <a:t>19 February 2019</a:t>
             </a:fld>
             <a:endParaRPr lang="ru-RU"/>
           </a:p>
@@ -2365,6 +2591,10 @@
           <a:bodyPr/>
           <a:lstStyle/>
           <a:p>
+            <a:r>
+              <a:rPr lang="en-US" smtClean="0"/>
+              <a:t>@Bellkross</a:t>
+            </a:r>
             <a:endParaRPr lang="ru-RU"/>
           </a:p>
         </p:txBody>
@@ -2402,14 +2632,21 @@
   <p:clrMapOvr>
     <a:masterClrMapping/>
   </p:clrMapOvr>
-  <mc:AlternateContent xmlns:mc="http://schemas.openxmlformats.org/markup-compatibility/2006">
-    <mc:Choice xmlns:p14="http://schemas.microsoft.com/office/powerpoint/2010/main" Requires="p14">
+  <mc:AlternateContent xmlns:mc="http://schemas.openxmlformats.org/markup-compatibility/2006" xmlns:p14="http://schemas.microsoft.com/office/powerpoint/2010/main">
+    <mc:Choice Requires="p14">
       <p:transition p14:dur="10" advClick="0"/>
     </mc:Choice>
-    <mc:Fallback>
+    <mc:Fallback xmlns="">
       <p:transition advClick="0"/>
     </mc:Fallback>
   </mc:AlternateContent>
+  <p:timing>
+    <p:tnLst>
+      <p:par>
+        <p:cTn id="1" dur="indefinite" restart="never" nodeType="tmRoot"/>
+      </p:par>
+    </p:tnLst>
+  </p:timing>
 </p:sldLayout>
 </file>
 
@@ -2627,9 +2864,9 @@
           <a:bodyPr/>
           <a:lstStyle/>
           <a:p>
-            <a:fld id="{5E987183-CF93-4028-987F-0BDD6D444B75}" type="datetimeFigureOut">
-              <a:rPr lang="ru-RU" smtClean="0"/>
-              <a:t>19.02.2019</a:t>
+            <a:fld id="{ABB24B70-A4CD-4445-BB16-669A3264FA19}" type="datetime3">
+              <a:rPr lang="en-US" smtClean="0"/>
+              <a:t>19 February 2019</a:t>
             </a:fld>
             <a:endParaRPr lang="ru-RU"/>
           </a:p>
@@ -2650,6 +2887,10 @@
           <a:bodyPr/>
           <a:lstStyle/>
           <a:p>
+            <a:r>
+              <a:rPr lang="en-US" smtClean="0"/>
+              <a:t>@Bellkross</a:t>
+            </a:r>
             <a:endParaRPr lang="ru-RU"/>
           </a:p>
         </p:txBody>
@@ -2687,11 +2928,11 @@
   <p:clrMapOvr>
     <a:masterClrMapping/>
   </p:clrMapOvr>
-  <mc:AlternateContent xmlns:mc="http://schemas.openxmlformats.org/markup-compatibility/2006">
-    <mc:Choice xmlns:p14="http://schemas.microsoft.com/office/powerpoint/2010/main" Requires="p14">
+  <mc:AlternateContent xmlns:mc="http://schemas.openxmlformats.org/markup-compatibility/2006" xmlns:p14="http://schemas.microsoft.com/office/powerpoint/2010/main">
+    <mc:Choice Requires="p14">
       <p:transition p14:dur="10" advClick="0"/>
     </mc:Choice>
-    <mc:Fallback>
+    <mc:Fallback xmlns="">
       <p:transition advClick="0"/>
     </mc:Fallback>
   </mc:AlternateContent>
@@ -2888,9 +3129,9 @@
           <a:bodyPr/>
           <a:lstStyle/>
           <a:p>
-            <a:fld id="{5E987183-CF93-4028-987F-0BDD6D444B75}" type="datetimeFigureOut">
-              <a:rPr lang="ru-RU" smtClean="0"/>
-              <a:t>19.02.2019</a:t>
+            <a:fld id="{CF014D9A-44C2-4A81-AA5B-B49ED5839460}" type="datetime3">
+              <a:rPr lang="en-US" smtClean="0"/>
+              <a:t>19 February 2019</a:t>
             </a:fld>
             <a:endParaRPr lang="ru-RU"/>
           </a:p>
@@ -2911,6 +3152,10 @@
           <a:bodyPr/>
           <a:lstStyle/>
           <a:p>
+            <a:r>
+              <a:rPr lang="en-US" smtClean="0"/>
+              <a:t>@Bellkross</a:t>
+            </a:r>
             <a:endParaRPr lang="ru-RU"/>
           </a:p>
         </p:txBody>
@@ -2948,11 +3193,11 @@
   <p:clrMapOvr>
     <a:masterClrMapping/>
   </p:clrMapOvr>
-  <mc:AlternateContent xmlns:mc="http://schemas.openxmlformats.org/markup-compatibility/2006">
-    <mc:Choice xmlns:p14="http://schemas.microsoft.com/office/powerpoint/2010/main" Requires="p14">
+  <mc:AlternateContent xmlns:mc="http://schemas.openxmlformats.org/markup-compatibility/2006" xmlns:p14="http://schemas.microsoft.com/office/powerpoint/2010/main">
+    <mc:Choice Requires="p14">
       <p:transition p14:dur="10" advClick="0"/>
     </mc:Choice>
-    <mc:Fallback>
+    <mc:Fallback xmlns="">
       <p:transition advClick="0"/>
     </mc:Fallback>
   </mc:AlternateContent>
@@ -3109,9 +3354,9 @@
             </a:lvl1pPr>
           </a:lstStyle>
           <a:p>
-            <a:fld id="{5E987183-CF93-4028-987F-0BDD6D444B75}" type="datetimeFigureOut">
-              <a:rPr lang="ru-RU" smtClean="0"/>
-              <a:t>19.02.2019</a:t>
+            <a:fld id="{9B43955C-E4C2-41B5-8098-ADB300087B42}" type="datetime3">
+              <a:rPr lang="en-US" smtClean="0"/>
+              <a:t>19 February 2019</a:t>
             </a:fld>
             <a:endParaRPr lang="ru-RU"/>
           </a:p>
@@ -3150,6 +3395,10 @@
             </a:lvl1pPr>
           </a:lstStyle>
           <a:p>
+            <a:r>
+              <a:rPr lang="en-US" smtClean="0"/>
+              <a:t>@Bellkross</a:t>
+            </a:r>
             <a:endParaRPr lang="ru-RU"/>
           </a:p>
         </p:txBody>
@@ -3216,14 +3465,22 @@
     <p:sldLayoutId id="2147483658" r:id="rId10"/>
     <p:sldLayoutId id="2147483659" r:id="rId11"/>
   </p:sldLayoutIdLst>
-  <mc:AlternateContent xmlns:mc="http://schemas.openxmlformats.org/markup-compatibility/2006">
-    <mc:Choice xmlns:p14="http://schemas.microsoft.com/office/powerpoint/2010/main" Requires="p14">
+  <mc:AlternateContent xmlns:mc="http://schemas.openxmlformats.org/markup-compatibility/2006" xmlns:p14="http://schemas.microsoft.com/office/powerpoint/2010/main">
+    <mc:Choice Requires="p14">
       <p:transition p14:dur="10" advClick="0"/>
     </mc:Choice>
-    <mc:Fallback>
+    <mc:Fallback xmlns="">
       <p:transition advClick="0"/>
     </mc:Fallback>
   </mc:AlternateContent>
+  <p:timing>
+    <p:tnLst>
+      <p:par>
+        <p:cTn id="1" dur="indefinite" restart="never" nodeType="tmRoot"/>
+      </p:par>
+    </p:tnLst>
+  </p:timing>
+  <p:hf hdr="0"/>
   <p:txStyles>
     <p:titleStyle>
       <a:lvl1pPr algn="l" defTabSz="914400" rtl="0" eaLnBrk="1" latinLnBrk="0" hangingPunct="1">
@@ -4870,11 +5127,11 @@
   <p:clrMapOvr>
     <a:masterClrMapping/>
   </p:clrMapOvr>
-  <mc:AlternateContent xmlns:mc="http://schemas.openxmlformats.org/markup-compatibility/2006">
-    <mc:Choice xmlns:p14="http://schemas.microsoft.com/office/powerpoint/2010/main" Requires="p14">
+  <mc:AlternateContent xmlns:mc="http://schemas.openxmlformats.org/markup-compatibility/2006" xmlns:p14="http://schemas.microsoft.com/office/powerpoint/2010/main">
+    <mc:Choice Requires="p14">
       <p:transition p14:dur="10" advClick="0"/>
     </mc:Choice>
-    <mc:Fallback>
+    <mc:Fallback xmlns="">
       <p:transition advClick="0"/>
     </mc:Fallback>
   </mc:AlternateContent>
@@ -5111,12 +5368,485 @@
       </p:grpSpPr>
       <p:sp>
         <p:nvSpPr>
-          <p:cNvPr id="2" name="Title 1"/>
-          <p:cNvSpPr>
+          <p:cNvPr id="12" name="Google Shape;196;p27"/>
+          <p:cNvSpPr txBox="1">
             <a:spLocks noGrp="1"/>
           </p:cNvSpPr>
           <p:nvPr>
             <p:ph type="title"/>
+          </p:nvPr>
+        </p:nvSpPr>
+        <p:spPr>
+          <a:xfrm>
+            <a:off x="246529" y="174418"/>
+            <a:ext cx="10515600" cy="1325563"/>
+          </a:xfrm>
+        </p:spPr>
+        <p:txBody>
+          <a:bodyPr>
+            <a:normAutofit/>
+          </a:bodyPr>
+          <a:lstStyle/>
+          <a:p>
+            <a:pPr lvl="0"/>
+            <a:r>
+              <a:rPr lang="en-US" sz="5400" b="1" dirty="0" smtClean="0">
+                <a:solidFill>
+                  <a:srgbClr val="A7D86D"/>
+                </a:solidFill>
+                <a:latin typeface="Arial Black" panose="020B0A04020102020204" pitchFamily="34" charset="0"/>
+              </a:rPr>
+              <a:t>Pattern relationships</a:t>
+            </a:r>
+            <a:endParaRPr lang="en-US" sz="5400" b="1" dirty="0">
+              <a:solidFill>
+                <a:srgbClr val="A7D86D"/>
+              </a:solidFill>
+              <a:latin typeface="Arial Black" panose="020B0A04020102020204" pitchFamily="34" charset="0"/>
+            </a:endParaRPr>
+          </a:p>
+        </p:txBody>
+      </p:sp>
+      <p:sp>
+        <p:nvSpPr>
+          <p:cNvPr id="15" name="Rounded Rectangle 14"/>
+          <p:cNvSpPr/>
+          <p:nvPr/>
+        </p:nvSpPr>
+        <p:spPr>
+          <a:xfrm flipH="1">
+            <a:off x="8081681" y="1542987"/>
+            <a:ext cx="3299012" cy="815962"/>
+          </a:xfrm>
+          <a:prstGeom prst="roundRect">
+            <a:avLst/>
+          </a:prstGeom>
+          <a:solidFill>
+            <a:srgbClr val="D8D5EB"/>
+          </a:solidFill>
+        </p:spPr>
+        <p:style>
+          <a:lnRef idx="2">
+            <a:schemeClr val="accent6">
+              <a:shade val="50000"/>
+            </a:schemeClr>
+          </a:lnRef>
+          <a:fillRef idx="1">
+            <a:schemeClr val="accent6"/>
+          </a:fillRef>
+          <a:effectRef idx="0">
+            <a:schemeClr val="accent6"/>
+          </a:effectRef>
+          <a:fontRef idx="minor">
+            <a:schemeClr val="lt1"/>
+          </a:fontRef>
+        </p:style>
+        <p:txBody>
+          <a:bodyPr rtlCol="0" anchor="ctr"/>
+          <a:lstStyle/>
+          <a:p>
+            <a:pPr algn="ctr"/>
+            <a:r>
+              <a:rPr lang="en-US" sz="3200" b="1" dirty="0" smtClean="0">
+                <a:ln w="10160">
+                  <a:solidFill>
+                    <a:schemeClr val="accent5"/>
+                  </a:solidFill>
+                  <a:prstDash val="solid"/>
+                </a:ln>
+                <a:solidFill>
+                  <a:srgbClr val="FFFFFF"/>
+                </a:solidFill>
+                <a:effectLst>
+                  <a:outerShdw blurRad="38100" dist="22860" dir="5400000" algn="tl" rotWithShape="0">
+                    <a:srgbClr val="000000">
+                      <a:alpha val="30000"/>
+                    </a:srgbClr>
+                  </a:outerShdw>
+                </a:effectLst>
+              </a:rPr>
+              <a:t>Abstract factory</a:t>
+            </a:r>
+            <a:endParaRPr lang="ru-RU" b="1" dirty="0">
+              <a:ln w="10160">
+                <a:solidFill>
+                  <a:schemeClr val="accent5"/>
+                </a:solidFill>
+                <a:prstDash val="solid"/>
+              </a:ln>
+              <a:solidFill>
+                <a:srgbClr val="FFFFFF"/>
+              </a:solidFill>
+              <a:effectLst>
+                <a:outerShdw blurRad="38100" dist="22860" dir="5400000" algn="tl" rotWithShape="0">
+                  <a:srgbClr val="000000">
+                    <a:alpha val="30000"/>
+                  </a:srgbClr>
+                </a:outerShdw>
+              </a:effectLst>
+            </a:endParaRPr>
+          </a:p>
+        </p:txBody>
+      </p:sp>
+      <p:sp>
+        <p:nvSpPr>
+          <p:cNvPr id="17" name="Rounded Rectangle 16"/>
+          <p:cNvSpPr/>
+          <p:nvPr/>
+        </p:nvSpPr>
+        <p:spPr>
+          <a:xfrm flipH="1">
+            <a:off x="8081681" y="2954220"/>
+            <a:ext cx="3299012" cy="815962"/>
+          </a:xfrm>
+          <a:prstGeom prst="roundRect">
+            <a:avLst/>
+          </a:prstGeom>
+          <a:solidFill>
+            <a:srgbClr val="D8D5EB"/>
+          </a:solidFill>
+        </p:spPr>
+        <p:style>
+          <a:lnRef idx="2">
+            <a:schemeClr val="accent6">
+              <a:shade val="50000"/>
+            </a:schemeClr>
+          </a:lnRef>
+          <a:fillRef idx="1">
+            <a:schemeClr val="accent6"/>
+          </a:fillRef>
+          <a:effectRef idx="0">
+            <a:schemeClr val="accent6"/>
+          </a:effectRef>
+          <a:fontRef idx="minor">
+            <a:schemeClr val="lt1"/>
+          </a:fontRef>
+        </p:style>
+        <p:txBody>
+          <a:bodyPr rtlCol="0" anchor="ctr"/>
+          <a:lstStyle/>
+          <a:p>
+            <a:pPr algn="ctr"/>
+            <a:r>
+              <a:rPr lang="en-US" sz="3200" b="1" dirty="0">
+                <a:ln w="10160">
+                  <a:solidFill>
+                    <a:schemeClr val="accent5"/>
+                  </a:solidFill>
+                  <a:prstDash val="solid"/>
+                </a:ln>
+                <a:solidFill>
+                  <a:srgbClr val="FFFFFF"/>
+                </a:solidFill>
+                <a:effectLst>
+                  <a:outerShdw blurRad="38100" dist="22860" dir="5400000" algn="tl" rotWithShape="0">
+                    <a:srgbClr val="000000">
+                      <a:alpha val="30000"/>
+                    </a:srgbClr>
+                  </a:outerShdw>
+                </a:effectLst>
+              </a:rPr>
+              <a:t>Facade</a:t>
+            </a:r>
+            <a:endParaRPr lang="ru-RU" b="1" dirty="0">
+              <a:ln w="10160">
+                <a:solidFill>
+                  <a:schemeClr val="accent5"/>
+                </a:solidFill>
+                <a:prstDash val="solid"/>
+              </a:ln>
+              <a:solidFill>
+                <a:srgbClr val="FFFFFF"/>
+              </a:solidFill>
+              <a:effectLst>
+                <a:outerShdw blurRad="38100" dist="22860" dir="5400000" algn="tl" rotWithShape="0">
+                  <a:srgbClr val="000000">
+                    <a:alpha val="30000"/>
+                  </a:srgbClr>
+                </a:outerShdw>
+              </a:effectLst>
+            </a:endParaRPr>
+          </a:p>
+        </p:txBody>
+      </p:sp>
+      <p:sp>
+        <p:nvSpPr>
+          <p:cNvPr id="18" name="Rounded Rectangle 17"/>
+          <p:cNvSpPr/>
+          <p:nvPr/>
+        </p:nvSpPr>
+        <p:spPr>
+          <a:xfrm flipH="1">
+            <a:off x="8081681" y="4365453"/>
+            <a:ext cx="3299012" cy="815962"/>
+          </a:xfrm>
+          <a:prstGeom prst="roundRect">
+            <a:avLst/>
+          </a:prstGeom>
+          <a:solidFill>
+            <a:srgbClr val="D8D5EB"/>
+          </a:solidFill>
+        </p:spPr>
+        <p:style>
+          <a:lnRef idx="2">
+            <a:schemeClr val="accent6">
+              <a:shade val="50000"/>
+            </a:schemeClr>
+          </a:lnRef>
+          <a:fillRef idx="1">
+            <a:schemeClr val="accent6"/>
+          </a:fillRef>
+          <a:effectRef idx="0">
+            <a:schemeClr val="accent6"/>
+          </a:effectRef>
+          <a:fontRef idx="minor">
+            <a:schemeClr val="lt1"/>
+          </a:fontRef>
+        </p:style>
+        <p:txBody>
+          <a:bodyPr rtlCol="0" anchor="ctr"/>
+          <a:lstStyle/>
+          <a:p>
+            <a:pPr algn="ctr"/>
+            <a:r>
+              <a:rPr lang="en-US" sz="3200" b="1" dirty="0">
+                <a:ln w="10160">
+                  <a:solidFill>
+                    <a:schemeClr val="accent5"/>
+                  </a:solidFill>
+                  <a:prstDash val="solid"/>
+                </a:ln>
+                <a:solidFill>
+                  <a:srgbClr val="FFFFFF"/>
+                </a:solidFill>
+                <a:effectLst>
+                  <a:outerShdw blurRad="38100" dist="22860" dir="5400000" algn="tl" rotWithShape="0">
+                    <a:srgbClr val="000000">
+                      <a:alpha val="30000"/>
+                    </a:srgbClr>
+                  </a:outerShdw>
+                </a:effectLst>
+              </a:rPr>
+              <a:t>Object pool</a:t>
+            </a:r>
+            <a:endParaRPr lang="ru-RU" sz="3200" b="1" dirty="0">
+              <a:ln w="10160">
+                <a:solidFill>
+                  <a:schemeClr val="accent5"/>
+                </a:solidFill>
+                <a:prstDash val="solid"/>
+              </a:ln>
+              <a:solidFill>
+                <a:srgbClr val="FFFFFF"/>
+              </a:solidFill>
+              <a:effectLst>
+                <a:outerShdw blurRad="38100" dist="22860" dir="5400000" algn="tl" rotWithShape="0">
+                  <a:srgbClr val="000000">
+                    <a:alpha val="30000"/>
+                  </a:srgbClr>
+                </a:outerShdw>
+              </a:effectLst>
+            </a:endParaRPr>
+          </a:p>
+        </p:txBody>
+      </p:sp>
+      <p:sp>
+        <p:nvSpPr>
+          <p:cNvPr id="19" name="Rounded Rectangle 18"/>
+          <p:cNvSpPr/>
+          <p:nvPr/>
+        </p:nvSpPr>
+        <p:spPr>
+          <a:xfrm flipH="1">
+            <a:off x="809064" y="2985596"/>
+            <a:ext cx="3299012" cy="815962"/>
+          </a:xfrm>
+          <a:prstGeom prst="roundRect">
+            <a:avLst/>
+          </a:prstGeom>
+          <a:solidFill>
+            <a:srgbClr val="D8D5EB"/>
+          </a:solidFill>
+        </p:spPr>
+        <p:style>
+          <a:lnRef idx="2">
+            <a:schemeClr val="accent6">
+              <a:shade val="50000"/>
+            </a:schemeClr>
+          </a:lnRef>
+          <a:fillRef idx="1">
+            <a:schemeClr val="accent6"/>
+          </a:fillRef>
+          <a:effectRef idx="0">
+            <a:schemeClr val="accent6"/>
+          </a:effectRef>
+          <a:fontRef idx="minor">
+            <a:schemeClr val="lt1"/>
+          </a:fontRef>
+        </p:style>
+        <p:txBody>
+          <a:bodyPr rtlCol="0" anchor="ctr"/>
+          <a:lstStyle/>
+          <a:p>
+            <a:pPr algn="ctr"/>
+            <a:r>
+              <a:rPr lang="en-US" sz="3200" b="1" dirty="0">
+                <a:ln w="10160">
+                  <a:solidFill>
+                    <a:schemeClr val="accent5"/>
+                  </a:solidFill>
+                  <a:prstDash val="solid"/>
+                </a:ln>
+                <a:solidFill>
+                  <a:srgbClr val="FFFFFF"/>
+                </a:solidFill>
+                <a:effectLst>
+                  <a:outerShdw blurRad="38100" dist="22860" dir="5400000" algn="tl" rotWithShape="0">
+                    <a:srgbClr val="000000">
+                      <a:alpha val="30000"/>
+                    </a:srgbClr>
+                  </a:outerShdw>
+                </a:effectLst>
+              </a:rPr>
+              <a:t>Singleton</a:t>
+            </a:r>
+            <a:endParaRPr lang="ru-RU" sz="3200" b="1" dirty="0">
+              <a:ln w="10160">
+                <a:solidFill>
+                  <a:schemeClr val="accent5"/>
+                </a:solidFill>
+                <a:prstDash val="solid"/>
+              </a:ln>
+              <a:solidFill>
+                <a:srgbClr val="FFFFFF"/>
+              </a:solidFill>
+              <a:effectLst>
+                <a:outerShdw blurRad="38100" dist="22860" dir="5400000" algn="tl" rotWithShape="0">
+                  <a:srgbClr val="000000">
+                    <a:alpha val="30000"/>
+                  </a:srgbClr>
+                </a:outerShdw>
+              </a:effectLst>
+            </a:endParaRPr>
+          </a:p>
+        </p:txBody>
+      </p:sp>
+      <p:cxnSp>
+        <p:nvCxnSpPr>
+          <p:cNvPr id="24" name="Straight Arrow Connector 23"/>
+          <p:cNvCxnSpPr>
+            <a:stCxn id="17" idx="3"/>
+            <a:endCxn id="19" idx="1"/>
+          </p:cNvCxnSpPr>
+          <p:nvPr/>
+        </p:nvCxnSpPr>
+        <p:spPr>
+          <a:xfrm flipH="1">
+            <a:off x="4108076" y="3362201"/>
+            <a:ext cx="3973605" cy="31376"/>
+          </a:xfrm>
+          <a:prstGeom prst="straightConnector1">
+            <a:avLst/>
+          </a:prstGeom>
+          <a:ln>
+            <a:tailEnd type="triangle"/>
+          </a:ln>
+        </p:spPr>
+        <p:style>
+          <a:lnRef idx="3">
+            <a:schemeClr val="accent6"/>
+          </a:lnRef>
+          <a:fillRef idx="0">
+            <a:schemeClr val="accent6"/>
+          </a:fillRef>
+          <a:effectRef idx="2">
+            <a:schemeClr val="accent6"/>
+          </a:effectRef>
+          <a:fontRef idx="minor">
+            <a:schemeClr val="tx1"/>
+          </a:fontRef>
+        </p:style>
+      </p:cxnSp>
+      <p:cxnSp>
+        <p:nvCxnSpPr>
+          <p:cNvPr id="32" name="Curved Connector 31"/>
+          <p:cNvCxnSpPr>
+            <a:stCxn id="15" idx="3"/>
+            <a:endCxn id="19" idx="0"/>
+          </p:cNvCxnSpPr>
+          <p:nvPr/>
+        </p:nvCxnSpPr>
+        <p:spPr>
+          <a:xfrm rot="10800000" flipV="1">
+            <a:off x="2458571" y="1950968"/>
+            <a:ext cx="5623111" cy="1034628"/>
+          </a:xfrm>
+          <a:prstGeom prst="curvedConnector2">
+            <a:avLst/>
+          </a:prstGeom>
+          <a:ln>
+            <a:tailEnd type="triangle"/>
+          </a:ln>
+        </p:spPr>
+        <p:style>
+          <a:lnRef idx="3">
+            <a:schemeClr val="accent6"/>
+          </a:lnRef>
+          <a:fillRef idx="0">
+            <a:schemeClr val="accent6"/>
+          </a:fillRef>
+          <a:effectRef idx="2">
+            <a:schemeClr val="accent6"/>
+          </a:effectRef>
+          <a:fontRef idx="minor">
+            <a:schemeClr val="tx1"/>
+          </a:fontRef>
+        </p:style>
+      </p:cxnSp>
+      <p:cxnSp>
+        <p:nvCxnSpPr>
+          <p:cNvPr id="39" name="Curved Connector 38"/>
+          <p:cNvCxnSpPr>
+            <a:stCxn id="18" idx="3"/>
+            <a:endCxn id="19" idx="2"/>
+          </p:cNvCxnSpPr>
+          <p:nvPr/>
+        </p:nvCxnSpPr>
+        <p:spPr>
+          <a:xfrm rot="10800000">
+            <a:off x="2458571" y="3801558"/>
+            <a:ext cx="5623111" cy="971876"/>
+          </a:xfrm>
+          <a:prstGeom prst="curvedConnector2">
+            <a:avLst/>
+          </a:prstGeom>
+          <a:ln>
+            <a:tailEnd type="triangle"/>
+          </a:ln>
+        </p:spPr>
+        <p:style>
+          <a:lnRef idx="3">
+            <a:schemeClr val="accent6"/>
+          </a:lnRef>
+          <a:fillRef idx="0">
+            <a:schemeClr val="accent6"/>
+          </a:fillRef>
+          <a:effectRef idx="2">
+            <a:schemeClr val="accent6"/>
+          </a:effectRef>
+          <a:fontRef idx="minor">
+            <a:schemeClr val="tx1"/>
+          </a:fontRef>
+        </p:style>
+      </p:cxnSp>
+      <p:sp>
+        <p:nvSpPr>
+          <p:cNvPr id="53" name="Date Placeholder 52"/>
+          <p:cNvSpPr>
+            <a:spLocks noGrp="1"/>
+          </p:cNvSpPr>
+          <p:nvPr>
+            <p:ph type="dt" sz="half" idx="10"/>
           </p:nvPr>
         </p:nvSpPr>
         <p:spPr/>
@@ -5124,18 +5854,22 @@
           <a:bodyPr/>
           <a:lstStyle/>
           <a:p>
-            <a:endParaRPr lang="ru-RU" dirty="0"/>
-          </a:p>
-        </p:txBody>
-      </p:sp>
-      <p:sp>
-        <p:nvSpPr>
-          <p:cNvPr id="3" name="Content Placeholder 2"/>
-          <p:cNvSpPr>
-            <a:spLocks noGrp="1"/>
-          </p:cNvSpPr>
-          <p:nvPr>
-            <p:ph idx="1"/>
+            <a:fld id="{B3D9764A-A7CD-4166-A3A4-6FABB32BD54E}" type="datetime3">
+              <a:rPr lang="en-US" smtClean="0"/>
+              <a:t>19 February 2019</a:t>
+            </a:fld>
+            <a:endParaRPr lang="ru-RU"/>
+          </a:p>
+        </p:txBody>
+      </p:sp>
+      <p:sp>
+        <p:nvSpPr>
+          <p:cNvPr id="54" name="Footer Placeholder 53"/>
+          <p:cNvSpPr>
+            <a:spLocks noGrp="1"/>
+          </p:cNvSpPr>
+          <p:nvPr>
+            <p:ph type="ftr" sz="quarter" idx="11"/>
           </p:nvPr>
         </p:nvSpPr>
         <p:spPr/>
@@ -5143,7 +5877,33 @@
           <a:bodyPr/>
           <a:lstStyle/>
           <a:p>
-            <a:endParaRPr lang="ru-RU"/>
+            <a:r>
+              <a:rPr lang="en-US" dirty="0" smtClean="0"/>
+              <a:t>@Bellkross</a:t>
+            </a:r>
+            <a:endParaRPr lang="ru-RU" dirty="0"/>
+          </a:p>
+        </p:txBody>
+      </p:sp>
+      <p:sp>
+        <p:nvSpPr>
+          <p:cNvPr id="55" name="Slide Number Placeholder 54"/>
+          <p:cNvSpPr>
+            <a:spLocks noGrp="1"/>
+          </p:cNvSpPr>
+          <p:nvPr>
+            <p:ph type="sldNum" sz="quarter" idx="12"/>
+          </p:nvPr>
+        </p:nvSpPr>
+        <p:spPr/>
+        <p:txBody>
+          <a:bodyPr/>
+          <a:lstStyle/>
+          <a:p>
+            <a:r>
+              <a:rPr lang="en-US" dirty="0" smtClean="0"/>
+              <a:t>1 out of 30</a:t>
+            </a:r>
           </a:p>
         </p:txBody>
       </p:sp>
@@ -5157,16 +5917,444 @@
   <p:clrMapOvr>
     <a:masterClrMapping/>
   </p:clrMapOvr>
-  <mc:AlternateContent xmlns:mc="http://schemas.openxmlformats.org/markup-compatibility/2006">
-    <mc:Choice xmlns:p14="http://schemas.microsoft.com/office/powerpoint/2010/main" Requires="p14">
+  <mc:AlternateContent xmlns:mc="http://schemas.openxmlformats.org/markup-compatibility/2006" xmlns:p14="http://schemas.microsoft.com/office/powerpoint/2010/main">
+    <mc:Choice Requires="p14">
       <p:transition spd="med" p14:dur="700" advClick="0">
         <p:fade/>
       </p:transition>
     </mc:Choice>
-    <mc:Fallback>
+    <mc:Fallback xmlns="">
       <p:transition spd="med" advClick="0">
         <p:fade/>
       </p:transition>
+    </mc:Fallback>
+  </mc:AlternateContent>
+  <p:timing>
+    <p:tnLst>
+      <p:par>
+        <p:cTn id="1" dur="indefinite" restart="never" nodeType="tmRoot">
+          <p:childTnLst>
+            <p:seq concurrent="1" nextAc="seek">
+              <p:cTn id="2" dur="indefinite" nodeType="mainSeq">
+                <p:childTnLst>
+                  <p:par>
+                    <p:cTn id="3" fill="hold">
+                      <p:stCondLst>
+                        <p:cond delay="indefinite"/>
+                      </p:stCondLst>
+                      <p:childTnLst>
+                        <p:par>
+                          <p:cTn id="4" fill="hold">
+                            <p:stCondLst>
+                              <p:cond delay="0"/>
+                            </p:stCondLst>
+                            <p:childTnLst>
+                              <p:par>
+                                <p:cTn id="5" presetID="10" presetClass="entr" presetSubtype="0" fill="hold" nodeType="clickEffect">
+                                  <p:stCondLst>
+                                    <p:cond delay="0"/>
+                                  </p:stCondLst>
+                                  <p:childTnLst>
+                                    <p:set>
+                                      <p:cBhvr>
+                                        <p:cTn id="6" dur="1" fill="hold">
+                                          <p:stCondLst>
+                                            <p:cond delay="0"/>
+                                          </p:stCondLst>
+                                        </p:cTn>
+                                        <p:tgtEl>
+                                          <p:spTgt spid="32"/>
+                                        </p:tgtEl>
+                                        <p:attrNameLst>
+                                          <p:attrName>style.visibility</p:attrName>
+                                        </p:attrNameLst>
+                                      </p:cBhvr>
+                                      <p:to>
+                                        <p:strVal val="visible"/>
+                                      </p:to>
+                                    </p:set>
+                                    <p:animEffect transition="in" filter="fade">
+                                      <p:cBhvr>
+                                        <p:cTn id="7" dur="500"/>
+                                        <p:tgtEl>
+                                          <p:spTgt spid="32"/>
+                                        </p:tgtEl>
+                                      </p:cBhvr>
+                                    </p:animEffect>
+                                  </p:childTnLst>
+                                </p:cTn>
+                              </p:par>
+                              <p:par>
+                                <p:cTn id="8" presetID="10" presetClass="entr" presetSubtype="0" fill="hold" grpId="0" nodeType="withEffect">
+                                  <p:stCondLst>
+                                    <p:cond delay="0"/>
+                                  </p:stCondLst>
+                                  <p:childTnLst>
+                                    <p:set>
+                                      <p:cBhvr>
+                                        <p:cTn id="9" dur="1" fill="hold">
+                                          <p:stCondLst>
+                                            <p:cond delay="0"/>
+                                          </p:stCondLst>
+                                        </p:cTn>
+                                        <p:tgtEl>
+                                          <p:spTgt spid="15"/>
+                                        </p:tgtEl>
+                                        <p:attrNameLst>
+                                          <p:attrName>style.visibility</p:attrName>
+                                        </p:attrNameLst>
+                                      </p:cBhvr>
+                                      <p:to>
+                                        <p:strVal val="visible"/>
+                                      </p:to>
+                                    </p:set>
+                                    <p:animEffect transition="in" filter="fade">
+                                      <p:cBhvr>
+                                        <p:cTn id="10" dur="500"/>
+                                        <p:tgtEl>
+                                          <p:spTgt spid="15"/>
+                                        </p:tgtEl>
+                                      </p:cBhvr>
+                                    </p:animEffect>
+                                  </p:childTnLst>
+                                </p:cTn>
+                              </p:par>
+                            </p:childTnLst>
+                          </p:cTn>
+                        </p:par>
+                      </p:childTnLst>
+                    </p:cTn>
+                  </p:par>
+                  <p:par>
+                    <p:cTn id="11" fill="hold">
+                      <p:stCondLst>
+                        <p:cond delay="indefinite"/>
+                      </p:stCondLst>
+                      <p:childTnLst>
+                        <p:par>
+                          <p:cTn id="12" fill="hold">
+                            <p:stCondLst>
+                              <p:cond delay="0"/>
+                            </p:stCondLst>
+                            <p:childTnLst>
+                              <p:par>
+                                <p:cTn id="13" presetID="10" presetClass="entr" presetSubtype="0" fill="hold" grpId="0" nodeType="clickEffect">
+                                  <p:stCondLst>
+                                    <p:cond delay="0"/>
+                                  </p:stCondLst>
+                                  <p:childTnLst>
+                                    <p:set>
+                                      <p:cBhvr>
+                                        <p:cTn id="14" dur="1" fill="hold">
+                                          <p:stCondLst>
+                                            <p:cond delay="0"/>
+                                          </p:stCondLst>
+                                        </p:cTn>
+                                        <p:tgtEl>
+                                          <p:spTgt spid="17"/>
+                                        </p:tgtEl>
+                                        <p:attrNameLst>
+                                          <p:attrName>style.visibility</p:attrName>
+                                        </p:attrNameLst>
+                                      </p:cBhvr>
+                                      <p:to>
+                                        <p:strVal val="visible"/>
+                                      </p:to>
+                                    </p:set>
+                                    <p:animEffect transition="in" filter="fade">
+                                      <p:cBhvr>
+                                        <p:cTn id="15" dur="500"/>
+                                        <p:tgtEl>
+                                          <p:spTgt spid="17"/>
+                                        </p:tgtEl>
+                                      </p:cBhvr>
+                                    </p:animEffect>
+                                  </p:childTnLst>
+                                </p:cTn>
+                              </p:par>
+                              <p:par>
+                                <p:cTn id="16" presetID="10" presetClass="entr" presetSubtype="0" fill="hold" nodeType="withEffect">
+                                  <p:stCondLst>
+                                    <p:cond delay="0"/>
+                                  </p:stCondLst>
+                                  <p:childTnLst>
+                                    <p:set>
+                                      <p:cBhvr>
+                                        <p:cTn id="17" dur="1" fill="hold">
+                                          <p:stCondLst>
+                                            <p:cond delay="0"/>
+                                          </p:stCondLst>
+                                        </p:cTn>
+                                        <p:tgtEl>
+                                          <p:spTgt spid="24"/>
+                                        </p:tgtEl>
+                                        <p:attrNameLst>
+                                          <p:attrName>style.visibility</p:attrName>
+                                        </p:attrNameLst>
+                                      </p:cBhvr>
+                                      <p:to>
+                                        <p:strVal val="visible"/>
+                                      </p:to>
+                                    </p:set>
+                                    <p:animEffect transition="in" filter="fade">
+                                      <p:cBhvr>
+                                        <p:cTn id="18" dur="500"/>
+                                        <p:tgtEl>
+                                          <p:spTgt spid="24"/>
+                                        </p:tgtEl>
+                                      </p:cBhvr>
+                                    </p:animEffect>
+                                  </p:childTnLst>
+                                </p:cTn>
+                              </p:par>
+                            </p:childTnLst>
+                          </p:cTn>
+                        </p:par>
+                      </p:childTnLst>
+                    </p:cTn>
+                  </p:par>
+                  <p:par>
+                    <p:cTn id="19" fill="hold">
+                      <p:stCondLst>
+                        <p:cond delay="indefinite"/>
+                      </p:stCondLst>
+                      <p:childTnLst>
+                        <p:par>
+                          <p:cTn id="20" fill="hold">
+                            <p:stCondLst>
+                              <p:cond delay="0"/>
+                            </p:stCondLst>
+                            <p:childTnLst>
+                              <p:par>
+                                <p:cTn id="21" presetID="10" presetClass="entr" presetSubtype="0" fill="hold" nodeType="clickEffect">
+                                  <p:stCondLst>
+                                    <p:cond delay="0"/>
+                                  </p:stCondLst>
+                                  <p:childTnLst>
+                                    <p:set>
+                                      <p:cBhvr>
+                                        <p:cTn id="22" dur="1" fill="hold">
+                                          <p:stCondLst>
+                                            <p:cond delay="0"/>
+                                          </p:stCondLst>
+                                        </p:cTn>
+                                        <p:tgtEl>
+                                          <p:spTgt spid="39"/>
+                                        </p:tgtEl>
+                                        <p:attrNameLst>
+                                          <p:attrName>style.visibility</p:attrName>
+                                        </p:attrNameLst>
+                                      </p:cBhvr>
+                                      <p:to>
+                                        <p:strVal val="visible"/>
+                                      </p:to>
+                                    </p:set>
+                                    <p:animEffect transition="in" filter="fade">
+                                      <p:cBhvr>
+                                        <p:cTn id="23" dur="500"/>
+                                        <p:tgtEl>
+                                          <p:spTgt spid="39"/>
+                                        </p:tgtEl>
+                                      </p:cBhvr>
+                                    </p:animEffect>
+                                  </p:childTnLst>
+                                </p:cTn>
+                              </p:par>
+                              <p:par>
+                                <p:cTn id="24" presetID="10" presetClass="entr" presetSubtype="0" fill="hold" grpId="0" nodeType="withEffect">
+                                  <p:stCondLst>
+                                    <p:cond delay="0"/>
+                                  </p:stCondLst>
+                                  <p:childTnLst>
+                                    <p:set>
+                                      <p:cBhvr>
+                                        <p:cTn id="25" dur="1" fill="hold">
+                                          <p:stCondLst>
+                                            <p:cond delay="0"/>
+                                          </p:stCondLst>
+                                        </p:cTn>
+                                        <p:tgtEl>
+                                          <p:spTgt spid="18"/>
+                                        </p:tgtEl>
+                                        <p:attrNameLst>
+                                          <p:attrName>style.visibility</p:attrName>
+                                        </p:attrNameLst>
+                                      </p:cBhvr>
+                                      <p:to>
+                                        <p:strVal val="visible"/>
+                                      </p:to>
+                                    </p:set>
+                                    <p:animEffect transition="in" filter="fade">
+                                      <p:cBhvr>
+                                        <p:cTn id="26" dur="500"/>
+                                        <p:tgtEl>
+                                          <p:spTgt spid="18"/>
+                                        </p:tgtEl>
+                                      </p:cBhvr>
+                                    </p:animEffect>
+                                  </p:childTnLst>
+                                </p:cTn>
+                              </p:par>
+                            </p:childTnLst>
+                          </p:cTn>
+                        </p:par>
+                      </p:childTnLst>
+                    </p:cTn>
+                  </p:par>
+                </p:childTnLst>
+              </p:cTn>
+              <p:prevCondLst>
+                <p:cond evt="onPrev" delay="0">
+                  <p:tgtEl>
+                    <p:sldTgt/>
+                  </p:tgtEl>
+                </p:cond>
+              </p:prevCondLst>
+              <p:nextCondLst>
+                <p:cond evt="onNext" delay="0">
+                  <p:tgtEl>
+                    <p:sldTgt/>
+                  </p:tgtEl>
+                </p:cond>
+              </p:nextCondLst>
+            </p:seq>
+          </p:childTnLst>
+        </p:cTn>
+      </p:par>
+    </p:tnLst>
+    <p:bldLst>
+      <p:bldP spid="15" grpId="0" animBg="1"/>
+      <p:bldP spid="17" grpId="0" animBg="1"/>
+      <p:bldP spid="18" grpId="0" animBg="1"/>
+    </p:bldLst>
+  </p:timing>
+</p:sld>
+</file>
+
+<file path=ppt/slides/slide3.xml><?xml version="1.0" encoding="utf-8"?>
+<p:sld xmlns:a="http://schemas.openxmlformats.org/drawingml/2006/main" xmlns:r="http://schemas.openxmlformats.org/officeDocument/2006/relationships" xmlns:p="http://schemas.openxmlformats.org/presentationml/2006/main">
+  <p:cSld>
+    <p:spTree>
+      <p:nvGrpSpPr>
+        <p:cNvPr id="1" name=""/>
+        <p:cNvGrpSpPr/>
+        <p:nvPr/>
+      </p:nvGrpSpPr>
+      <p:grpSpPr>
+        <a:xfrm>
+          <a:off x="0" y="0"/>
+          <a:ext cx="0" cy="0"/>
+          <a:chOff x="0" y="0"/>
+          <a:chExt cx="0" cy="0"/>
+        </a:xfrm>
+      </p:grpSpPr>
+      <p:sp>
+        <p:nvSpPr>
+          <p:cNvPr id="2" name="Title 1"/>
+          <p:cNvSpPr>
+            <a:spLocks noGrp="1"/>
+          </p:cNvSpPr>
+          <p:nvPr>
+            <p:ph type="title"/>
+          </p:nvPr>
+        </p:nvSpPr>
+        <p:spPr/>
+        <p:txBody>
+          <a:bodyPr/>
+          <a:lstStyle/>
+          <a:p>
+            <a:endParaRPr lang="ru-RU"/>
+          </a:p>
+        </p:txBody>
+      </p:sp>
+      <p:sp>
+        <p:nvSpPr>
+          <p:cNvPr id="3" name="Date Placeholder 2"/>
+          <p:cNvSpPr>
+            <a:spLocks noGrp="1"/>
+          </p:cNvSpPr>
+          <p:nvPr>
+            <p:ph type="dt" sz="half" idx="10"/>
+          </p:nvPr>
+        </p:nvSpPr>
+        <p:spPr/>
+        <p:txBody>
+          <a:bodyPr/>
+          <a:lstStyle/>
+          <a:p>
+            <a:fld id="{AB18DE3F-9B93-4889-A323-6EC312FABF66}" type="datetime3">
+              <a:rPr lang="en-US" smtClean="0"/>
+              <a:t>19 February 2019</a:t>
+            </a:fld>
+            <a:endParaRPr lang="ru-RU"/>
+          </a:p>
+        </p:txBody>
+      </p:sp>
+      <p:sp>
+        <p:nvSpPr>
+          <p:cNvPr id="4" name="Footer Placeholder 3"/>
+          <p:cNvSpPr>
+            <a:spLocks noGrp="1"/>
+          </p:cNvSpPr>
+          <p:nvPr>
+            <p:ph type="ftr" sz="quarter" idx="11"/>
+          </p:nvPr>
+        </p:nvSpPr>
+        <p:spPr/>
+        <p:txBody>
+          <a:bodyPr/>
+          <a:lstStyle/>
+          <a:p>
+            <a:r>
+              <a:rPr lang="en-US" smtClean="0"/>
+              <a:t>@Bellkross</a:t>
+            </a:r>
+            <a:endParaRPr lang="ru-RU"/>
+          </a:p>
+        </p:txBody>
+      </p:sp>
+      <p:sp>
+        <p:nvSpPr>
+          <p:cNvPr id="5" name="Slide Number Placeholder 4"/>
+          <p:cNvSpPr>
+            <a:spLocks noGrp="1"/>
+          </p:cNvSpPr>
+          <p:nvPr>
+            <p:ph type="sldNum" sz="quarter" idx="12"/>
+          </p:nvPr>
+        </p:nvSpPr>
+        <p:spPr/>
+        <p:txBody>
+          <a:bodyPr/>
+          <a:lstStyle/>
+          <a:p>
+            <a:r>
+              <a:rPr lang="en-US" dirty="0" smtClean="0"/>
+              <a:t>2 </a:t>
+            </a:r>
+            <a:r>
+              <a:rPr lang="en-US" dirty="0"/>
+              <a:t>out of 30</a:t>
+            </a:r>
+          </a:p>
+        </p:txBody>
+      </p:sp>
+    </p:spTree>
+    <p:extLst>
+      <p:ext uri="{BB962C8B-B14F-4D97-AF65-F5344CB8AC3E}">
+        <p14:creationId xmlns:p14="http://schemas.microsoft.com/office/powerpoint/2010/main" val="1276426009"/>
+      </p:ext>
+    </p:extLst>
+  </p:cSld>
+  <p:clrMapOvr>
+    <a:masterClrMapping/>
+  </p:clrMapOvr>
+  <mc:AlternateContent xmlns:mc="http://schemas.openxmlformats.org/markup-compatibility/2006" xmlns:p14="http://schemas.microsoft.com/office/powerpoint/2010/main">
+    <mc:Choice Requires="p14">
+      <p:transition p14:dur="10" advClick="0"/>
+    </mc:Choice>
+    <mc:Fallback xmlns="">
+      <p:transition advClick="0"/>
     </mc:Fallback>
   </mc:AlternateContent>
   <p:timing>
@@ -5701,6 +6889,267 @@
 </a:theme>
 </file>
 
+<file path=ppt/theme/theme3.xml><?xml version="1.0" encoding="utf-8"?>
+<a:theme xmlns:a="http://schemas.openxmlformats.org/drawingml/2006/main" name="Office Theme">
+  <a:themeElements>
+    <a:clrScheme name="Office">
+      <a:dk1>
+        <a:sysClr val="windowText" lastClr="000000"/>
+      </a:dk1>
+      <a:lt1>
+        <a:sysClr val="window" lastClr="FFFFFF"/>
+      </a:lt1>
+      <a:dk2>
+        <a:srgbClr val="44546A"/>
+      </a:dk2>
+      <a:lt2>
+        <a:srgbClr val="E7E6E6"/>
+      </a:lt2>
+      <a:accent1>
+        <a:srgbClr val="5B9BD5"/>
+      </a:accent1>
+      <a:accent2>
+        <a:srgbClr val="ED7D31"/>
+      </a:accent2>
+      <a:accent3>
+        <a:srgbClr val="A5A5A5"/>
+      </a:accent3>
+      <a:accent4>
+        <a:srgbClr val="FFC000"/>
+      </a:accent4>
+      <a:accent5>
+        <a:srgbClr val="4472C4"/>
+      </a:accent5>
+      <a:accent6>
+        <a:srgbClr val="70AD47"/>
+      </a:accent6>
+      <a:hlink>
+        <a:srgbClr val="0563C1"/>
+      </a:hlink>
+      <a:folHlink>
+        <a:srgbClr val="954F72"/>
+      </a:folHlink>
+    </a:clrScheme>
+    <a:fontScheme name="Office">
+      <a:majorFont>
+        <a:latin typeface="Calibri Light" panose="020F0302020204030204"/>
+        <a:ea typeface=""/>
+        <a:cs typeface=""/>
+        <a:font script="Jpan" typeface="游ゴシック Light"/>
+        <a:font script="Hang" typeface="맑은 고딕"/>
+        <a:font script="Hans" typeface="等线 Light"/>
+        <a:font script="Hant" typeface="新細明體"/>
+        <a:font script="Arab" typeface="Times New Roman"/>
+        <a:font script="Hebr" typeface="Times New Roman"/>
+        <a:font script="Thai" typeface="Angsana New"/>
+        <a:font script="Ethi" typeface="Nyala"/>
+        <a:font script="Beng" typeface="Vrinda"/>
+        <a:font script="Gujr" typeface="Shruti"/>
+        <a:font script="Khmr" typeface="MoolBoran"/>
+        <a:font script="Knda" typeface="Tunga"/>
+        <a:font script="Guru" typeface="Raavi"/>
+        <a:font script="Cans" typeface="Euphemia"/>
+        <a:font script="Cher" typeface="Plantagenet Cherokee"/>
+        <a:font script="Yiii" typeface="Microsoft Yi Baiti"/>
+        <a:font script="Tibt" typeface="Microsoft Himalaya"/>
+        <a:font script="Thaa" typeface="MV Boli"/>
+        <a:font script="Deva" typeface="Mangal"/>
+        <a:font script="Telu" typeface="Gautami"/>
+        <a:font script="Taml" typeface="Latha"/>
+        <a:font script="Syrc" typeface="Estrangelo Edessa"/>
+        <a:font script="Orya" typeface="Kalinga"/>
+        <a:font script="Mlym" typeface="Kartika"/>
+        <a:font script="Laoo" typeface="DokChampa"/>
+        <a:font script="Sinh" typeface="Iskoola Pota"/>
+        <a:font script="Mong" typeface="Mongolian Baiti"/>
+        <a:font script="Viet" typeface="Times New Roman"/>
+        <a:font script="Uigh" typeface="Microsoft Uighur"/>
+        <a:font script="Geor" typeface="Sylfaen"/>
+      </a:majorFont>
+      <a:minorFont>
+        <a:latin typeface="Calibri" panose="020F0502020204030204"/>
+        <a:ea typeface=""/>
+        <a:cs typeface=""/>
+        <a:font script="Jpan" typeface="游ゴシック"/>
+        <a:font script="Hang" typeface="맑은 고딕"/>
+        <a:font script="Hans" typeface="等线"/>
+        <a:font script="Hant" typeface="新細明體"/>
+        <a:font script="Arab" typeface="Arial"/>
+        <a:font script="Hebr" typeface="Arial"/>
+        <a:font script="Thai" typeface="Cordia New"/>
+        <a:font script="Ethi" typeface="Nyala"/>
+        <a:font script="Beng" typeface="Vrinda"/>
+        <a:font script="Gujr" typeface="Shruti"/>
+        <a:font script="Khmr" typeface="DaunPenh"/>
+        <a:font script="Knda" typeface="Tunga"/>
+        <a:font script="Guru" typeface="Raavi"/>
+        <a:font script="Cans" typeface="Euphemia"/>
+        <a:font script="Cher" typeface="Plantagenet Cherokee"/>
+        <a:font script="Yiii" typeface="Microsoft Yi Baiti"/>
+        <a:font script="Tibt" typeface="Microsoft Himalaya"/>
+        <a:font script="Thaa" typeface="MV Boli"/>
+        <a:font script="Deva" typeface="Mangal"/>
+        <a:font script="Telu" typeface="Gautami"/>
+        <a:font script="Taml" typeface="Latha"/>
+        <a:font script="Syrc" typeface="Estrangelo Edessa"/>
+        <a:font script="Orya" typeface="Kalinga"/>
+        <a:font script="Mlym" typeface="Kartika"/>
+        <a:font script="Laoo" typeface="DokChampa"/>
+        <a:font script="Sinh" typeface="Iskoola Pota"/>
+        <a:font script="Mong" typeface="Mongolian Baiti"/>
+        <a:font script="Viet" typeface="Arial"/>
+        <a:font script="Uigh" typeface="Microsoft Uighur"/>
+        <a:font script="Geor" typeface="Sylfaen"/>
+      </a:minorFont>
+    </a:fontScheme>
+    <a:fmtScheme name="Office">
+      <a:fillStyleLst>
+        <a:solidFill>
+          <a:schemeClr val="phClr"/>
+        </a:solidFill>
+        <a:gradFill rotWithShape="1">
+          <a:gsLst>
+            <a:gs pos="0">
+              <a:schemeClr val="phClr">
+                <a:lumMod val="110000"/>
+                <a:satMod val="105000"/>
+                <a:tint val="67000"/>
+              </a:schemeClr>
+            </a:gs>
+            <a:gs pos="50000">
+              <a:schemeClr val="phClr">
+                <a:lumMod val="105000"/>
+                <a:satMod val="103000"/>
+                <a:tint val="73000"/>
+              </a:schemeClr>
+            </a:gs>
+            <a:gs pos="100000">
+              <a:schemeClr val="phClr">
+                <a:lumMod val="105000"/>
+                <a:satMod val="109000"/>
+                <a:tint val="81000"/>
+              </a:schemeClr>
+            </a:gs>
+          </a:gsLst>
+          <a:lin ang="5400000" scaled="0"/>
+        </a:gradFill>
+        <a:gradFill rotWithShape="1">
+          <a:gsLst>
+            <a:gs pos="0">
+              <a:schemeClr val="phClr">
+                <a:satMod val="103000"/>
+                <a:lumMod val="102000"/>
+                <a:tint val="94000"/>
+              </a:schemeClr>
+            </a:gs>
+            <a:gs pos="50000">
+              <a:schemeClr val="phClr">
+                <a:satMod val="110000"/>
+                <a:lumMod val="100000"/>
+                <a:shade val="100000"/>
+              </a:schemeClr>
+            </a:gs>
+            <a:gs pos="100000">
+              <a:schemeClr val="phClr">
+                <a:lumMod val="99000"/>
+                <a:satMod val="120000"/>
+                <a:shade val="78000"/>
+              </a:schemeClr>
+            </a:gs>
+          </a:gsLst>
+          <a:lin ang="5400000" scaled="0"/>
+        </a:gradFill>
+      </a:fillStyleLst>
+      <a:lnStyleLst>
+        <a:ln w="6350" cap="flat" cmpd="sng" algn="ctr">
+          <a:solidFill>
+            <a:schemeClr val="phClr"/>
+          </a:solidFill>
+          <a:prstDash val="solid"/>
+          <a:miter lim="800000"/>
+        </a:ln>
+        <a:ln w="12700" cap="flat" cmpd="sng" algn="ctr">
+          <a:solidFill>
+            <a:schemeClr val="phClr"/>
+          </a:solidFill>
+          <a:prstDash val="solid"/>
+          <a:miter lim="800000"/>
+        </a:ln>
+        <a:ln w="19050" cap="flat" cmpd="sng" algn="ctr">
+          <a:solidFill>
+            <a:schemeClr val="phClr"/>
+          </a:solidFill>
+          <a:prstDash val="solid"/>
+          <a:miter lim="800000"/>
+        </a:ln>
+      </a:lnStyleLst>
+      <a:effectStyleLst>
+        <a:effectStyle>
+          <a:effectLst/>
+        </a:effectStyle>
+        <a:effectStyle>
+          <a:effectLst/>
+        </a:effectStyle>
+        <a:effectStyle>
+          <a:effectLst>
+            <a:outerShdw blurRad="57150" dist="19050" dir="5400000" algn="ctr" rotWithShape="0">
+              <a:srgbClr val="000000">
+                <a:alpha val="63000"/>
+              </a:srgbClr>
+            </a:outerShdw>
+          </a:effectLst>
+        </a:effectStyle>
+      </a:effectStyleLst>
+      <a:bgFillStyleLst>
+        <a:solidFill>
+          <a:schemeClr val="phClr"/>
+        </a:solidFill>
+        <a:solidFill>
+          <a:schemeClr val="phClr">
+            <a:tint val="95000"/>
+            <a:satMod val="170000"/>
+          </a:schemeClr>
+        </a:solidFill>
+        <a:gradFill rotWithShape="1">
+          <a:gsLst>
+            <a:gs pos="0">
+              <a:schemeClr val="phClr">
+                <a:tint val="93000"/>
+                <a:satMod val="150000"/>
+                <a:shade val="98000"/>
+                <a:lumMod val="102000"/>
+              </a:schemeClr>
+            </a:gs>
+            <a:gs pos="50000">
+              <a:schemeClr val="phClr">
+                <a:tint val="98000"/>
+                <a:satMod val="130000"/>
+                <a:shade val="90000"/>
+                <a:lumMod val="103000"/>
+              </a:schemeClr>
+            </a:gs>
+            <a:gs pos="100000">
+              <a:schemeClr val="phClr">
+                <a:shade val="63000"/>
+                <a:satMod val="120000"/>
+              </a:schemeClr>
+            </a:gs>
+          </a:gsLst>
+          <a:lin ang="5400000" scaled="0"/>
+        </a:gradFill>
+      </a:bgFillStyleLst>
+    </a:fmtScheme>
+  </a:themeElements>
+  <a:objectDefaults/>
+  <a:extraClrSchemeLst/>
+  <a:extLst>
+    <a:ext uri="{05A4C25C-085E-4340-85A3-A5531E510DB2}">
+      <thm15:themeFamily xmlns:thm15="http://schemas.microsoft.com/office/thememl/2012/main" name="Office Theme" id="{62F939B6-93AF-4DB8-9C6B-D6C7DFDC589F}" vid="{4A3C46E8-61CC-4603-A589-7422A47A8E4A}"/>
+    </a:ext>
+  </a:extLst>
+</a:theme>
+</file>
+
 <file path=customXml/item1.xml><?xml version="1.0" encoding="utf-8"?>
 <Control xmlns="http://schemas.microsoft.com/VisualStudio/2011/storyboarding/control">
   <Id Name="d5cbc8f2-26ed-44ab-947b-8653b8f3b28c" Revision="1" Stencil="System.MyShapes" StencilVersion="1.0"/>

</xml_diff>

<commit_message>
Change Singleton presentation footer color
Signed-off-by: Kyrylo Vasylenko <vasilenkowm@gmail.com>
</commit_message>
<xml_diff>
--- a/Singleton/Presentation/Singleton.pptx
+++ b/Singleton/Presentation/Singleton.pptx
@@ -5855,21 +5855,29 @@
           <a:lstStyle/>
           <a:p>
             <a:fld id="{B3D9764A-A7CD-4166-A3A4-6FABB32BD54E}" type="datetime3">
-              <a:rPr lang="en-US" smtClean="0"/>
+              <a:rPr lang="en-US" smtClean="0">
+                <a:solidFill>
+                  <a:srgbClr val="A7D86D"/>
+                </a:solidFill>
+              </a:rPr>
               <a:t>19 February 2019</a:t>
             </a:fld>
-            <a:endParaRPr lang="ru-RU"/>
-          </a:p>
-        </p:txBody>
-      </p:sp>
-      <p:sp>
-        <p:nvSpPr>
-          <p:cNvPr id="54" name="Footer Placeholder 53"/>
-          <p:cNvSpPr>
-            <a:spLocks noGrp="1"/>
-          </p:cNvSpPr>
-          <p:nvPr>
-            <p:ph type="ftr" sz="quarter" idx="11"/>
+            <a:endParaRPr lang="ru-RU">
+              <a:solidFill>
+                <a:srgbClr val="A7D86D"/>
+              </a:solidFill>
+            </a:endParaRPr>
+          </a:p>
+        </p:txBody>
+      </p:sp>
+      <p:sp>
+        <p:nvSpPr>
+          <p:cNvPr id="55" name="Slide Number Placeholder 54"/>
+          <p:cNvSpPr>
+            <a:spLocks noGrp="1"/>
+          </p:cNvSpPr>
+          <p:nvPr>
+            <p:ph type="sldNum" sz="quarter" idx="12"/>
           </p:nvPr>
         </p:nvSpPr>
         <p:spPr/>
@@ -5878,30 +5886,11 @@
           <a:lstStyle/>
           <a:p>
             <a:r>
-              <a:rPr lang="en-US" dirty="0" smtClean="0"/>
-              <a:t>@Bellkross</a:t>
-            </a:r>
-            <a:endParaRPr lang="ru-RU" dirty="0"/>
-          </a:p>
-        </p:txBody>
-      </p:sp>
-      <p:sp>
-        <p:nvSpPr>
-          <p:cNvPr id="55" name="Slide Number Placeholder 54"/>
-          <p:cNvSpPr>
-            <a:spLocks noGrp="1"/>
-          </p:cNvSpPr>
-          <p:nvPr>
-            <p:ph type="sldNum" sz="quarter" idx="12"/>
-          </p:nvPr>
-        </p:nvSpPr>
-        <p:spPr/>
-        <p:txBody>
-          <a:bodyPr/>
-          <a:lstStyle/>
-          <a:p>
-            <a:r>
-              <a:rPr lang="en-US" dirty="0" smtClean="0"/>
+              <a:rPr lang="en-US" dirty="0" smtClean="0">
+                <a:solidFill>
+                  <a:srgbClr val="A7D86D"/>
+                </a:solidFill>
+              </a:rPr>
               <a:t>1 out of 30</a:t>
             </a:r>
           </a:p>
@@ -6283,21 +6272,29 @@
           <a:lstStyle/>
           <a:p>
             <a:fld id="{AB18DE3F-9B93-4889-A323-6EC312FABF66}" type="datetime3">
-              <a:rPr lang="en-US" smtClean="0"/>
+              <a:rPr lang="en-US" smtClean="0">
+                <a:solidFill>
+                  <a:srgbClr val="A7D86D"/>
+                </a:solidFill>
+              </a:rPr>
               <a:t>19 February 2019</a:t>
             </a:fld>
-            <a:endParaRPr lang="ru-RU"/>
-          </a:p>
-        </p:txBody>
-      </p:sp>
-      <p:sp>
-        <p:nvSpPr>
-          <p:cNvPr id="4" name="Footer Placeholder 3"/>
-          <p:cNvSpPr>
-            <a:spLocks noGrp="1"/>
-          </p:cNvSpPr>
-          <p:nvPr>
-            <p:ph type="ftr" sz="quarter" idx="11"/>
+            <a:endParaRPr lang="ru-RU">
+              <a:solidFill>
+                <a:srgbClr val="A7D86D"/>
+              </a:solidFill>
+            </a:endParaRPr>
+          </a:p>
+        </p:txBody>
+      </p:sp>
+      <p:sp>
+        <p:nvSpPr>
+          <p:cNvPr id="5" name="Slide Number Placeholder 4"/>
+          <p:cNvSpPr>
+            <a:spLocks noGrp="1"/>
+          </p:cNvSpPr>
+          <p:nvPr>
+            <p:ph type="sldNum" sz="quarter" idx="12"/>
           </p:nvPr>
         </p:nvSpPr>
         <p:spPr/>
@@ -6306,34 +6303,19 @@
           <a:lstStyle/>
           <a:p>
             <a:r>
-              <a:rPr lang="en-US" smtClean="0"/>
-              <a:t>@Bellkross</a:t>
-            </a:r>
-            <a:endParaRPr lang="ru-RU"/>
-          </a:p>
-        </p:txBody>
-      </p:sp>
-      <p:sp>
-        <p:nvSpPr>
-          <p:cNvPr id="5" name="Slide Number Placeholder 4"/>
-          <p:cNvSpPr>
-            <a:spLocks noGrp="1"/>
-          </p:cNvSpPr>
-          <p:nvPr>
-            <p:ph type="sldNum" sz="quarter" idx="12"/>
-          </p:nvPr>
-        </p:nvSpPr>
-        <p:spPr/>
-        <p:txBody>
-          <a:bodyPr/>
-          <a:lstStyle/>
-          <a:p>
-            <a:r>
-              <a:rPr lang="en-US" dirty="0" smtClean="0"/>
+              <a:rPr lang="en-US" dirty="0" smtClean="0">
+                <a:solidFill>
+                  <a:srgbClr val="A7D86D"/>
+                </a:solidFill>
+              </a:rPr>
               <a:t>2 </a:t>
             </a:r>
             <a:r>
-              <a:rPr lang="en-US" dirty="0"/>
+              <a:rPr lang="en-US" dirty="0">
+                <a:solidFill>
+                  <a:srgbClr val="A7D86D"/>
+                </a:solidFill>
+              </a:rPr>
               <a:t>out of 30</a:t>
             </a:r>
           </a:p>

</xml_diff>